<commit_message>
More minor changes to SOLID materials
</commit_message>
<xml_diff>
--- a/Chap/SOLID/Presentations/SOLID.pptx
+++ b/Chap/SOLID/Presentations/SOLID.pptx
@@ -96,21 +96,22 @@
     <p:sldId id="704" r:id="rId90"/>
     <p:sldId id="705" r:id="rId91"/>
     <p:sldId id="706" r:id="rId92"/>
-    <p:sldId id="712" r:id="rId93"/>
-    <p:sldId id="714" r:id="rId94"/>
-    <p:sldId id="715" r:id="rId95"/>
-    <p:sldId id="716" r:id="rId96"/>
-    <p:sldId id="625" r:id="rId97"/>
-    <p:sldId id="720" r:id="rId98"/>
-    <p:sldId id="717" r:id="rId99"/>
-    <p:sldId id="494" r:id="rId100"/>
-    <p:sldId id="721" r:id="rId101"/>
-    <p:sldId id="718" r:id="rId102"/>
-    <p:sldId id="499" r:id="rId103"/>
-    <p:sldId id="722" r:id="rId104"/>
-    <p:sldId id="719" r:id="rId105"/>
-    <p:sldId id="500" r:id="rId106"/>
-    <p:sldId id="723" r:id="rId107"/>
+    <p:sldId id="724" r:id="rId93"/>
+    <p:sldId id="712" r:id="rId94"/>
+    <p:sldId id="714" r:id="rId95"/>
+    <p:sldId id="715" r:id="rId96"/>
+    <p:sldId id="716" r:id="rId97"/>
+    <p:sldId id="625" r:id="rId98"/>
+    <p:sldId id="720" r:id="rId99"/>
+    <p:sldId id="717" r:id="rId100"/>
+    <p:sldId id="494" r:id="rId101"/>
+    <p:sldId id="721" r:id="rId102"/>
+    <p:sldId id="718" r:id="rId103"/>
+    <p:sldId id="499" r:id="rId104"/>
+    <p:sldId id="722" r:id="rId105"/>
+    <p:sldId id="719" r:id="rId106"/>
+    <p:sldId id="500" r:id="rId107"/>
+    <p:sldId id="723" r:id="rId108"/>
   </p:sldIdLst>
   <p:sldSz cx="12192000" cy="6858000"/>
   <p:notesSz cx="6858000" cy="9144000"/>
@@ -7624,7 +7625,7 @@
           <a:p>
             <a:fld id="{E15B7D8E-2A20-4C0E-991C-872DBB7459A8}" type="datetimeFigureOut">
               <a:rPr lang="da-DK" smtClean="0"/>
-              <a:t>11-03-2019</a:t>
+              <a:t>12-03-2019</a:t>
             </a:fld>
             <a:endParaRPr lang="da-DK"/>
           </a:p>
@@ -7794,7 +7795,7 @@
           <a:p>
             <a:fld id="{E15B7D8E-2A20-4C0E-991C-872DBB7459A8}" type="datetimeFigureOut">
               <a:rPr lang="da-DK" smtClean="0"/>
-              <a:t>11-03-2019</a:t>
+              <a:t>12-03-2019</a:t>
             </a:fld>
             <a:endParaRPr lang="da-DK"/>
           </a:p>
@@ -7974,7 +7975,7 @@
           <a:p>
             <a:fld id="{E15B7D8E-2A20-4C0E-991C-872DBB7459A8}" type="datetimeFigureOut">
               <a:rPr lang="da-DK" smtClean="0"/>
-              <a:t>11-03-2019</a:t>
+              <a:t>12-03-2019</a:t>
             </a:fld>
             <a:endParaRPr lang="da-DK"/>
           </a:p>
@@ -8144,7 +8145,7 @@
           <a:p>
             <a:fld id="{E15B7D8E-2A20-4C0E-991C-872DBB7459A8}" type="datetimeFigureOut">
               <a:rPr lang="da-DK" smtClean="0"/>
-              <a:t>11-03-2019</a:t>
+              <a:t>12-03-2019</a:t>
             </a:fld>
             <a:endParaRPr lang="da-DK"/>
           </a:p>
@@ -8390,7 +8391,7 @@
           <a:p>
             <a:fld id="{E15B7D8E-2A20-4C0E-991C-872DBB7459A8}" type="datetimeFigureOut">
               <a:rPr lang="da-DK" smtClean="0"/>
-              <a:t>11-03-2019</a:t>
+              <a:t>12-03-2019</a:t>
             </a:fld>
             <a:endParaRPr lang="da-DK"/>
           </a:p>
@@ -8622,7 +8623,7 @@
           <a:p>
             <a:fld id="{E15B7D8E-2A20-4C0E-991C-872DBB7459A8}" type="datetimeFigureOut">
               <a:rPr lang="da-DK" smtClean="0"/>
-              <a:t>11-03-2019</a:t>
+              <a:t>12-03-2019</a:t>
             </a:fld>
             <a:endParaRPr lang="da-DK"/>
           </a:p>
@@ -8989,7 +8990,7 @@
           <a:p>
             <a:fld id="{E15B7D8E-2A20-4C0E-991C-872DBB7459A8}" type="datetimeFigureOut">
               <a:rPr lang="da-DK" smtClean="0"/>
-              <a:t>11-03-2019</a:t>
+              <a:t>12-03-2019</a:t>
             </a:fld>
             <a:endParaRPr lang="da-DK"/>
           </a:p>
@@ -9107,7 +9108,7 @@
           <a:p>
             <a:fld id="{E15B7D8E-2A20-4C0E-991C-872DBB7459A8}" type="datetimeFigureOut">
               <a:rPr lang="da-DK" smtClean="0"/>
-              <a:t>11-03-2019</a:t>
+              <a:t>12-03-2019</a:t>
             </a:fld>
             <a:endParaRPr lang="da-DK"/>
           </a:p>
@@ -9202,7 +9203,7 @@
           <a:p>
             <a:fld id="{E15B7D8E-2A20-4C0E-991C-872DBB7459A8}" type="datetimeFigureOut">
               <a:rPr lang="da-DK" smtClean="0"/>
-              <a:t>11-03-2019</a:t>
+              <a:t>12-03-2019</a:t>
             </a:fld>
             <a:endParaRPr lang="da-DK"/>
           </a:p>
@@ -9479,7 +9480,7 @@
           <a:p>
             <a:fld id="{E15B7D8E-2A20-4C0E-991C-872DBB7459A8}" type="datetimeFigureOut">
               <a:rPr lang="da-DK" smtClean="0"/>
-              <a:t>11-03-2019</a:t>
+              <a:t>12-03-2019</a:t>
             </a:fld>
             <a:endParaRPr lang="da-DK"/>
           </a:p>
@@ -9732,7 +9733,7 @@
           <a:p>
             <a:fld id="{E15B7D8E-2A20-4C0E-991C-872DBB7459A8}" type="datetimeFigureOut">
               <a:rPr lang="da-DK" smtClean="0"/>
-              <a:t>11-03-2019</a:t>
+              <a:t>12-03-2019</a:t>
             </a:fld>
             <a:endParaRPr lang="da-DK"/>
           </a:p>
@@ -9945,7 +9946,7 @@
           <a:p>
             <a:fld id="{E15B7D8E-2A20-4C0E-991C-872DBB7459A8}" type="datetimeFigureOut">
               <a:rPr lang="da-DK" smtClean="0"/>
-              <a:t>11-03-2019</a:t>
+              <a:t>12-03-2019</a:t>
             </a:fld>
             <a:endParaRPr lang="da-DK"/>
           </a:p>
@@ -10591,7 +10592,67 @@
           <a:p>
             <a:r>
               <a:rPr lang="da-DK" sz="3200" smtClean="0"/>
-              <a:t>More to follow…</a:t>
+              <a:t>Software entities should be </a:t>
+            </a:r>
+            <a:r>
+              <a:rPr lang="da-DK" sz="3200" b="1" smtClean="0"/>
+              <a:t>open</a:t>
+            </a:r>
+            <a:r>
+              <a:rPr lang="da-DK" sz="3200" smtClean="0"/>
+              <a:t> for </a:t>
+            </a:r>
+            <a:r>
+              <a:rPr lang="da-DK" sz="3200" b="1" smtClean="0"/>
+              <a:t>extension</a:t>
+            </a:r>
+            <a:r>
+              <a:rPr lang="da-DK" sz="3200" smtClean="0"/>
+              <a:t>, but </a:t>
+            </a:r>
+            <a:r>
+              <a:rPr lang="da-DK" sz="3200" b="1" smtClean="0"/>
+              <a:t>closed</a:t>
+            </a:r>
+            <a:r>
+              <a:rPr lang="da-DK" sz="3200" smtClean="0"/>
+              <a:t> for </a:t>
+            </a:r>
+            <a:r>
+              <a:rPr lang="da-DK" sz="3200" b="1" smtClean="0"/>
+              <a:t>modification</a:t>
+            </a:r>
+            <a:r>
+              <a:rPr lang="da-DK" sz="3200" smtClean="0"/>
+              <a:t>.</a:t>
+            </a:r>
+          </a:p>
+          <a:p>
+            <a:r>
+              <a:rPr lang="da-DK" sz="3200" b="1" smtClean="0"/>
+              <a:t>Open for extension</a:t>
+            </a:r>
+            <a:r>
+              <a:rPr lang="da-DK" sz="3200" smtClean="0"/>
+              <a:t>: behavior can be extended with new behaviors</a:t>
+            </a:r>
+          </a:p>
+          <a:p>
+            <a:r>
+              <a:rPr lang="da-DK" sz="3200" b="1" smtClean="0"/>
+              <a:t>Closed for modification</a:t>
+            </a:r>
+            <a:r>
+              <a:rPr lang="da-DK" sz="3200" smtClean="0"/>
+              <a:t>: Extension does </a:t>
+            </a:r>
+            <a:r>
+              <a:rPr lang="da-DK" sz="3200" u="sng" smtClean="0"/>
+              <a:t>not</a:t>
+            </a:r>
+            <a:r>
+              <a:rPr lang="da-DK" sz="3200" smtClean="0"/>
+              <a:t> require change in the source code for the entity</a:t>
             </a:r>
             <a:endParaRPr lang="da-DK" sz="3200"/>
           </a:p>
@@ -10600,7 +10661,7 @@
     </p:spTree>
     <p:extLst>
       <p:ext uri="{BB962C8B-B14F-4D97-AF65-F5344CB8AC3E}">
-        <p14:creationId xmlns:p14="http://schemas.microsoft.com/office/powerpoint/2010/main" val="2138077730"/>
+        <p14:creationId xmlns:p14="http://schemas.microsoft.com/office/powerpoint/2010/main" val="72600078"/>
       </p:ext>
     </p:extLst>
   </p:cSld>
@@ -10644,46 +10705,59 @@
             <p:ph type="title"/>
           </p:nvPr>
         </p:nvSpPr>
+        <p:spPr/>
+        <p:txBody>
+          <a:bodyPr/>
+          <a:lstStyle/>
+          <a:p>
+            <a:r>
+              <a:rPr lang="da-DK" b="1" smtClean="0">
+                <a:solidFill>
+                  <a:srgbClr val="FF0000"/>
+                </a:solidFill>
+              </a:rPr>
+              <a:t>O</a:t>
+            </a:r>
+            <a:r>
+              <a:rPr lang="da-DK" b="1" smtClean="0"/>
+              <a:t>pen/Closed</a:t>
+            </a:r>
+            <a:endParaRPr lang="da-DK" b="1"/>
+          </a:p>
+        </p:txBody>
+      </p:sp>
+      <p:sp>
+        <p:nvSpPr>
+          <p:cNvPr id="3" name="Pladsholder til indhold 2"/>
+          <p:cNvSpPr>
+            <a:spLocks noGrp="1"/>
+          </p:cNvSpPr>
+          <p:nvPr>
+            <p:ph idx="1"/>
+          </p:nvPr>
+        </p:nvSpPr>
         <p:spPr>
           <a:xfrm>
-            <a:off x="831427" y="800100"/>
-            <a:ext cx="10515600" cy="4938963"/>
+            <a:off x="838199" y="1825625"/>
+            <a:ext cx="8456195" cy="4351338"/>
           </a:xfrm>
         </p:spPr>
         <p:txBody>
-          <a:bodyPr>
-            <a:noAutofit/>
-          </a:bodyPr>
+          <a:bodyPr/>
           <a:lstStyle/>
           <a:p>
-            <a:pPr algn="ctr"/>
-            <a:r>
-              <a:rPr lang="da-DK" sz="9600" b="1" smtClean="0">
-                <a:solidFill>
-                  <a:srgbClr val="FF0000"/>
-                </a:solidFill>
-              </a:rPr>
-              <a:t>L</a:t>
-            </a:r>
-            <a:r>
-              <a:rPr lang="da-DK" sz="9600" b="1" smtClean="0"/>
-              <a:t>iskov</a:t>
-            </a:r>
-            <a:br>
-              <a:rPr lang="da-DK" sz="9600" b="1" smtClean="0"/>
-            </a:br>
-            <a:r>
-              <a:rPr lang="da-DK" sz="9600" b="1" smtClean="0"/>
-              <a:t> Substitution</a:t>
-            </a:r>
-            <a:endParaRPr lang="da-DK" sz="9600" b="1"/>
+            <a:r>
+              <a:rPr lang="da-DK" sz="3200" smtClean="0"/>
+              <a:t>More to follow…</a:t>
+            </a:r>
+            <a:endParaRPr lang="da-DK" sz="3200"/>
           </a:p>
         </p:txBody>
       </p:sp>
     </p:spTree>
     <p:extLst>
       <p:ext uri="{BB962C8B-B14F-4D97-AF65-F5344CB8AC3E}">
-        <p14:creationId xmlns:p14="http://schemas.microsoft.com/office/powerpoint/2010/main" val="3962757869"/>
+        <p14:creationId xmlns:p14="http://schemas.microsoft.com/office/powerpoint/2010/main" val="2138077730"/>
       </p:ext>
     </p:extLst>
   </p:cSld>
@@ -10727,77 +10801,46 @@
             <p:ph type="title"/>
           </p:nvPr>
         </p:nvSpPr>
-        <p:spPr/>
-        <p:txBody>
-          <a:bodyPr/>
-          <a:lstStyle/>
-          <a:p>
-            <a:r>
-              <a:rPr lang="da-DK" b="1">
-                <a:solidFill>
-                  <a:srgbClr val="FF0000"/>
-                </a:solidFill>
-              </a:rPr>
-              <a:t>L</a:t>
-            </a:r>
-            <a:r>
-              <a:rPr lang="da-DK" b="1" smtClean="0"/>
-              <a:t>iskov Substitution</a:t>
-            </a:r>
-            <a:endParaRPr lang="da-DK" b="1"/>
-          </a:p>
-        </p:txBody>
-      </p:sp>
-      <p:sp>
-        <p:nvSpPr>
-          <p:cNvPr id="3" name="Pladsholder til indhold 2"/>
-          <p:cNvSpPr>
-            <a:spLocks noGrp="1"/>
-          </p:cNvSpPr>
-          <p:nvPr>
-            <p:ph idx="1"/>
-          </p:nvPr>
-        </p:nvSpPr>
         <p:spPr>
           <a:xfrm>
-            <a:off x="838200" y="1825625"/>
-            <a:ext cx="7006389" cy="4351338"/>
+            <a:off x="831427" y="800100"/>
+            <a:ext cx="10515600" cy="4938963"/>
           </a:xfrm>
         </p:spPr>
         <p:txBody>
-          <a:bodyPr/>
+          <a:bodyPr>
+            <a:noAutofit/>
+          </a:bodyPr>
           <a:lstStyle/>
           <a:p>
-            <a:r>
-              <a:rPr lang="da-DK" sz="3200" smtClean="0"/>
-              <a:t>Principle relating to how to create inheritance hierarchies</a:t>
-            </a:r>
-          </a:p>
-          <a:p>
-            <a:r>
-              <a:rPr lang="da-DK" sz="3200" smtClean="0"/>
-              <a:t>Ensures that a client can use </a:t>
-            </a:r>
-            <a:r>
-              <a:rPr lang="da-DK" sz="3200" u="sng" smtClean="0"/>
-              <a:t>subclasses</a:t>
-            </a:r>
-            <a:r>
-              <a:rPr lang="da-DK" sz="3200" smtClean="0"/>
-              <a:t> of provided classes without changing the expected </a:t>
-            </a:r>
-            <a:r>
-              <a:rPr lang="da-DK" sz="3200" smtClean="0"/>
-              <a:t>behavior</a:t>
-            </a:r>
-            <a:endParaRPr lang="da-DK" sz="3200" smtClean="0"/>
+            <a:pPr algn="ctr"/>
+            <a:r>
+              <a:rPr lang="da-DK" sz="9600" b="1" smtClean="0">
+                <a:solidFill>
+                  <a:srgbClr val="FF0000"/>
+                </a:solidFill>
+              </a:rPr>
+              <a:t>L</a:t>
+            </a:r>
+            <a:r>
+              <a:rPr lang="da-DK" sz="9600" b="1" smtClean="0"/>
+              <a:t>iskov</a:t>
+            </a:r>
+            <a:br>
+              <a:rPr lang="da-DK" sz="9600" b="1" smtClean="0"/>
+            </a:br>
+            <a:r>
+              <a:rPr lang="da-DK" sz="9600" b="1" smtClean="0"/>
+              <a:t> Substitution</a:t>
+            </a:r>
+            <a:endParaRPr lang="da-DK" sz="9600" b="1"/>
           </a:p>
         </p:txBody>
       </p:sp>
     </p:spTree>
     <p:extLst>
       <p:ext uri="{BB962C8B-B14F-4D97-AF65-F5344CB8AC3E}">
-        <p14:creationId xmlns:p14="http://schemas.microsoft.com/office/powerpoint/2010/main" val="2809050361"/>
+        <p14:creationId xmlns:p14="http://schemas.microsoft.com/office/powerpoint/2010/main" val="3962757869"/>
       </p:ext>
     </p:extLst>
   </p:cSld>
@@ -10884,16 +10927,29 @@
           <a:p>
             <a:r>
               <a:rPr lang="da-DK" sz="3200" smtClean="0"/>
-              <a:t>More to follow…</a:t>
-            </a:r>
-            <a:endParaRPr lang="da-DK" sz="3200" smtClean="0"/>
+              <a:t>Principle relating to how to create inheritance hierarchies</a:t>
+            </a:r>
+          </a:p>
+          <a:p>
+            <a:r>
+              <a:rPr lang="da-DK" sz="3200" smtClean="0"/>
+              <a:t>Ensures that a client can use </a:t>
+            </a:r>
+            <a:r>
+              <a:rPr lang="da-DK" sz="3200" u="sng" smtClean="0"/>
+              <a:t>subclasses</a:t>
+            </a:r>
+            <a:r>
+              <a:rPr lang="da-DK" sz="3200" smtClean="0"/>
+              <a:t> of provided classes without changing the expected behavior</a:t>
+            </a:r>
           </a:p>
         </p:txBody>
       </p:sp>
     </p:spTree>
     <p:extLst>
       <p:ext uri="{BB962C8B-B14F-4D97-AF65-F5344CB8AC3E}">
-        <p14:creationId xmlns:p14="http://schemas.microsoft.com/office/powerpoint/2010/main" val="2247997599"/>
+        <p14:creationId xmlns:p14="http://schemas.microsoft.com/office/powerpoint/2010/main" val="2809050361"/>
       </p:ext>
     </p:extLst>
   </p:cSld>
@@ -10937,50 +10993,58 @@
             <p:ph type="title"/>
           </p:nvPr>
         </p:nvSpPr>
+        <p:spPr/>
+        <p:txBody>
+          <a:bodyPr/>
+          <a:lstStyle/>
+          <a:p>
+            <a:r>
+              <a:rPr lang="da-DK" b="1">
+                <a:solidFill>
+                  <a:srgbClr val="FF0000"/>
+                </a:solidFill>
+              </a:rPr>
+              <a:t>L</a:t>
+            </a:r>
+            <a:r>
+              <a:rPr lang="da-DK" b="1" smtClean="0"/>
+              <a:t>iskov Substitution</a:t>
+            </a:r>
+            <a:endParaRPr lang="da-DK" b="1"/>
+          </a:p>
+        </p:txBody>
+      </p:sp>
+      <p:sp>
+        <p:nvSpPr>
+          <p:cNvPr id="3" name="Pladsholder til indhold 2"/>
+          <p:cNvSpPr>
+            <a:spLocks noGrp="1"/>
+          </p:cNvSpPr>
+          <p:nvPr>
+            <p:ph idx="1"/>
+          </p:nvPr>
+        </p:nvSpPr>
         <p:spPr>
           <a:xfrm>
-            <a:off x="831427" y="800100"/>
-            <a:ext cx="10515600" cy="4938963"/>
+            <a:off x="838200" y="1825625"/>
+            <a:ext cx="7006389" cy="4351338"/>
           </a:xfrm>
         </p:spPr>
         <p:txBody>
-          <a:bodyPr>
-            <a:noAutofit/>
-          </a:bodyPr>
+          <a:bodyPr/>
           <a:lstStyle/>
           <a:p>
-            <a:pPr algn="ctr"/>
-            <a:r>
-              <a:rPr lang="da-DK" sz="9600" b="1" smtClean="0">
-                <a:solidFill>
-                  <a:srgbClr val="FF0000"/>
-                </a:solidFill>
-              </a:rPr>
-              <a:t>I</a:t>
-            </a:r>
-            <a:r>
-              <a:rPr lang="da-DK" sz="9600" b="1" smtClean="0"/>
-              <a:t>nterface</a:t>
-            </a:r>
-            <a:r>
-              <a:rPr lang="da-DK" sz="9600" b="1" smtClean="0"/>
-              <a:t/>
-            </a:r>
-            <a:br>
-              <a:rPr lang="da-DK" sz="9600" b="1" smtClean="0"/>
-            </a:br>
-            <a:r>
-              <a:rPr lang="da-DK" sz="9600" b="1" smtClean="0"/>
-              <a:t> Segregation</a:t>
-            </a:r>
-            <a:endParaRPr lang="da-DK" sz="9600" b="1"/>
+            <a:r>
+              <a:rPr lang="da-DK" sz="3200" smtClean="0"/>
+              <a:t>More to follow…</a:t>
+            </a:r>
           </a:p>
         </p:txBody>
       </p:sp>
     </p:spTree>
     <p:extLst>
       <p:ext uri="{BB962C8B-B14F-4D97-AF65-F5344CB8AC3E}">
-        <p14:creationId xmlns:p14="http://schemas.microsoft.com/office/powerpoint/2010/main" val="2612605440"/>
+        <p14:creationId xmlns:p14="http://schemas.microsoft.com/office/powerpoint/2010/main" val="2247997599"/>
       </p:ext>
     </p:extLst>
   </p:cSld>
@@ -11024,119 +11088,46 @@
             <p:ph type="title"/>
           </p:nvPr>
         </p:nvSpPr>
-        <p:spPr/>
-        <p:txBody>
-          <a:bodyPr/>
-          <a:lstStyle/>
-          <a:p>
-            <a:r>
-              <a:rPr lang="da-DK" b="1" smtClean="0">
-                <a:solidFill>
-                  <a:srgbClr val="FF0000"/>
-                </a:solidFill>
-              </a:rPr>
-              <a:t>I</a:t>
-            </a:r>
-            <a:r>
-              <a:rPr lang="da-DK" b="1" smtClean="0"/>
-              <a:t>nterface Segregation</a:t>
-            </a:r>
-            <a:endParaRPr lang="da-DK" b="1"/>
-          </a:p>
-        </p:txBody>
-      </p:sp>
-      <p:sp>
-        <p:nvSpPr>
-          <p:cNvPr id="3" name="Pladsholder til indhold 2"/>
-          <p:cNvSpPr>
-            <a:spLocks noGrp="1"/>
-          </p:cNvSpPr>
-          <p:nvPr>
-            <p:ph idx="1"/>
-          </p:nvPr>
-        </p:nvSpPr>
         <p:spPr>
           <a:xfrm>
-            <a:off x="838199" y="1825625"/>
-            <a:ext cx="8492289" cy="4351338"/>
+            <a:off x="831427" y="800100"/>
+            <a:ext cx="10515600" cy="4938963"/>
           </a:xfrm>
         </p:spPr>
         <p:txBody>
-          <a:bodyPr/>
+          <a:bodyPr>
+            <a:noAutofit/>
+          </a:bodyPr>
           <a:lstStyle/>
           <a:p>
-            <a:r>
-              <a:rPr lang="da-DK" sz="3200" b="1" smtClean="0"/>
-              <a:t>Interfaces</a:t>
-            </a:r>
-            <a:r>
-              <a:rPr lang="da-DK" sz="3200" smtClean="0"/>
-              <a:t>: abstract definitions of behavior</a:t>
-            </a:r>
-          </a:p>
-          <a:p>
-            <a:r>
-              <a:rPr lang="da-DK" sz="3200" smtClean="0"/>
-              <a:t>Clients should ”see” objects through interfaces</a:t>
-            </a:r>
-          </a:p>
-          <a:p>
-            <a:r>
-              <a:rPr lang="da-DK" sz="3200" smtClean="0"/>
-              <a:t>Smaller interfaces =&gt; </a:t>
-            </a:r>
-            <a:r>
-              <a:rPr lang="da-DK" sz="3200" b="1" smtClean="0"/>
-              <a:t>less dependency </a:t>
-            </a:r>
-            <a:r>
-              <a:rPr lang="da-DK" sz="3200" smtClean="0"/>
-              <a:t>between clients and objects</a:t>
-            </a:r>
-          </a:p>
-          <a:p>
-            <a:r>
-              <a:rPr lang="da-DK" sz="3200" b="1" smtClean="0"/>
-              <a:t>One</a:t>
-            </a:r>
-            <a:r>
-              <a:rPr lang="da-DK" sz="3200" smtClean="0"/>
-              <a:t> object may implement </a:t>
-            </a:r>
-            <a:r>
-              <a:rPr lang="da-DK" sz="3200" b="1" smtClean="0"/>
-              <a:t>many</a:t>
-            </a:r>
-            <a:r>
-              <a:rPr lang="da-DK" sz="3200" smtClean="0"/>
-              <a:t> interfaces</a:t>
-            </a:r>
-          </a:p>
-          <a:p>
-            <a:r>
-              <a:rPr lang="da-DK" sz="3200" smtClean="0"/>
-              <a:t>Keep interfaces </a:t>
-            </a:r>
-            <a:r>
-              <a:rPr lang="da-DK" sz="3200" b="1" smtClean="0"/>
-              <a:t>small</a:t>
-            </a:r>
-            <a:r>
-              <a:rPr lang="da-DK" sz="3200" smtClean="0"/>
-              <a:t> and </a:t>
-            </a:r>
-            <a:r>
-              <a:rPr lang="da-DK" sz="3200" b="1" smtClean="0"/>
-              <a:t>focused</a:t>
-            </a:r>
-            <a:endParaRPr lang="da-DK" sz="3200" b="1"/>
+            <a:pPr algn="ctr"/>
+            <a:r>
+              <a:rPr lang="da-DK" sz="9600" b="1" smtClean="0">
+                <a:solidFill>
+                  <a:srgbClr val="FF0000"/>
+                </a:solidFill>
+              </a:rPr>
+              <a:t>I</a:t>
+            </a:r>
+            <a:r>
+              <a:rPr lang="da-DK" sz="9600" b="1" smtClean="0"/>
+              <a:t>nterface</a:t>
+            </a:r>
+            <a:br>
+              <a:rPr lang="da-DK" sz="9600" b="1" smtClean="0"/>
+            </a:br>
+            <a:r>
+              <a:rPr lang="da-DK" sz="9600" b="1" smtClean="0"/>
+              <a:t> Segregation</a:t>
+            </a:r>
+            <a:endParaRPr lang="da-DK" sz="9600" b="1"/>
           </a:p>
         </p:txBody>
       </p:sp>
     </p:spTree>
     <p:extLst>
       <p:ext uri="{BB962C8B-B14F-4D97-AF65-F5344CB8AC3E}">
-        <p14:creationId xmlns:p14="http://schemas.microsoft.com/office/powerpoint/2010/main" val="4045933311"/>
+        <p14:creationId xmlns:p14="http://schemas.microsoft.com/office/powerpoint/2010/main" val="2612605440"/>
       </p:ext>
     </p:extLst>
   </p:cSld>
@@ -11222,10 +11213,165 @@
           <a:lstStyle/>
           <a:p>
             <a:r>
+              <a:rPr lang="da-DK" sz="3200" b="1" smtClean="0"/>
+              <a:t>Interfaces</a:t>
+            </a:r>
+            <a:r>
+              <a:rPr lang="da-DK" sz="3200" smtClean="0"/>
+              <a:t>: abstract definitions of behavior</a:t>
+            </a:r>
+          </a:p>
+          <a:p>
+            <a:r>
+              <a:rPr lang="da-DK" sz="3200" smtClean="0"/>
+              <a:t>Clients should ”see” objects through interfaces</a:t>
+            </a:r>
+          </a:p>
+          <a:p>
+            <a:r>
+              <a:rPr lang="da-DK" sz="3200" smtClean="0"/>
+              <a:t>Smaller interfaces =&gt; </a:t>
+            </a:r>
+            <a:r>
+              <a:rPr lang="da-DK" sz="3200" b="1" smtClean="0"/>
+              <a:t>less dependency </a:t>
+            </a:r>
+            <a:r>
+              <a:rPr lang="da-DK" sz="3200" smtClean="0"/>
+              <a:t>between clients and objects</a:t>
+            </a:r>
+          </a:p>
+          <a:p>
+            <a:r>
+              <a:rPr lang="da-DK" sz="3200" b="1" smtClean="0"/>
+              <a:t>One</a:t>
+            </a:r>
+            <a:r>
+              <a:rPr lang="da-DK" sz="3200" smtClean="0"/>
+              <a:t> object may implement </a:t>
+            </a:r>
+            <a:r>
+              <a:rPr lang="da-DK" sz="3200" b="1" smtClean="0"/>
+              <a:t>many</a:t>
+            </a:r>
+            <a:r>
+              <a:rPr lang="da-DK" sz="3200" smtClean="0"/>
+              <a:t> interfaces</a:t>
+            </a:r>
+          </a:p>
+          <a:p>
+            <a:r>
+              <a:rPr lang="da-DK" sz="3200" smtClean="0"/>
+              <a:t>Keep interfaces </a:t>
+            </a:r>
+            <a:r>
+              <a:rPr lang="da-DK" sz="3200" b="1" smtClean="0"/>
+              <a:t>small</a:t>
+            </a:r>
+            <a:r>
+              <a:rPr lang="da-DK" sz="3200" smtClean="0"/>
+              <a:t> and </a:t>
+            </a:r>
+            <a:r>
+              <a:rPr lang="da-DK" sz="3200" b="1" smtClean="0"/>
+              <a:t>focused</a:t>
+            </a:r>
+            <a:endParaRPr lang="da-DK" sz="3200" b="1"/>
+          </a:p>
+        </p:txBody>
+      </p:sp>
+    </p:spTree>
+    <p:extLst>
+      <p:ext uri="{BB962C8B-B14F-4D97-AF65-F5344CB8AC3E}">
+        <p14:creationId xmlns:p14="http://schemas.microsoft.com/office/powerpoint/2010/main" val="4045933311"/>
+      </p:ext>
+    </p:extLst>
+  </p:cSld>
+  <p:clrMapOvr>
+    <a:masterClrMapping/>
+  </p:clrMapOvr>
+  <p:timing>
+    <p:tnLst>
+      <p:par>
+        <p:cTn id="1" dur="indefinite" restart="never" nodeType="tmRoot"/>
+      </p:par>
+    </p:tnLst>
+  </p:timing>
+</p:sld>
+</file>
+
+<file path=ppt/slides/slide107.xml><?xml version="1.0" encoding="utf-8"?>
+<p:sld xmlns:a="http://schemas.openxmlformats.org/drawingml/2006/main" xmlns:r="http://schemas.openxmlformats.org/officeDocument/2006/relationships" xmlns:p="http://schemas.openxmlformats.org/presentationml/2006/main">
+  <p:cSld>
+    <p:spTree>
+      <p:nvGrpSpPr>
+        <p:cNvPr id="1" name=""/>
+        <p:cNvGrpSpPr/>
+        <p:nvPr/>
+      </p:nvGrpSpPr>
+      <p:grpSpPr>
+        <a:xfrm>
+          <a:off x="0" y="0"/>
+          <a:ext cx="0" cy="0"/>
+          <a:chOff x="0" y="0"/>
+          <a:chExt cx="0" cy="0"/>
+        </a:xfrm>
+      </p:grpSpPr>
+      <p:sp>
+        <p:nvSpPr>
+          <p:cNvPr id="2" name="Titel 1"/>
+          <p:cNvSpPr>
+            <a:spLocks noGrp="1"/>
+          </p:cNvSpPr>
+          <p:nvPr>
+            <p:ph type="title"/>
+          </p:nvPr>
+        </p:nvSpPr>
+        <p:spPr/>
+        <p:txBody>
+          <a:bodyPr/>
+          <a:lstStyle/>
+          <a:p>
+            <a:r>
+              <a:rPr lang="da-DK" b="1" smtClean="0">
+                <a:solidFill>
+                  <a:srgbClr val="FF0000"/>
+                </a:solidFill>
+              </a:rPr>
+              <a:t>I</a:t>
+            </a:r>
+            <a:r>
+              <a:rPr lang="da-DK" b="1" smtClean="0"/>
+              <a:t>nterface Segregation</a:t>
+            </a:r>
+            <a:endParaRPr lang="da-DK" b="1"/>
+          </a:p>
+        </p:txBody>
+      </p:sp>
+      <p:sp>
+        <p:nvSpPr>
+          <p:cNvPr id="3" name="Pladsholder til indhold 2"/>
+          <p:cNvSpPr>
+            <a:spLocks noGrp="1"/>
+          </p:cNvSpPr>
+          <p:nvPr>
+            <p:ph idx="1"/>
+          </p:nvPr>
+        </p:nvSpPr>
+        <p:spPr>
+          <a:xfrm>
+            <a:off x="838199" y="1825625"/>
+            <a:ext cx="8492289" cy="4351338"/>
+          </a:xfrm>
+        </p:spPr>
+        <p:txBody>
+          <a:bodyPr/>
+          <a:lstStyle/>
+          <a:p>
+            <a:r>
               <a:rPr lang="da-DK" sz="3200" smtClean="0"/>
               <a:t>More to follow…</a:t>
             </a:r>
-            <a:endParaRPr lang="da-DK" sz="3200" smtClean="0"/>
           </a:p>
         </p:txBody>
       </p:sp>
@@ -14101,11 +14247,7 @@
             <a:pPr lvl="1"/>
             <a:r>
               <a:rPr lang="da-DK" smtClean="0"/>
-              <a:t>Almost none</a:t>
-            </a:r>
-            <a:r>
-              <a:rPr lang="da-DK" smtClean="0"/>
-              <a:t>…</a:t>
+              <a:t>Almost none…</a:t>
             </a:r>
           </a:p>
         </p:txBody>
@@ -14316,22 +14458,14 @@
             <a:pPr lvl="1"/>
             <a:r>
               <a:rPr lang="da-DK" smtClean="0"/>
-              <a:t>Uses own methods for </a:t>
-            </a:r>
+              <a:t>Uses own methods for implementation</a:t>
+            </a:r>
+          </a:p>
+          <a:p>
+            <a:pPr lvl="1"/>
             <a:r>
               <a:rPr lang="da-DK" smtClean="0"/>
-              <a:t>implementation</a:t>
-            </a:r>
-          </a:p>
-          <a:p>
-            <a:pPr lvl="1"/>
-            <a:r>
-              <a:rPr lang="da-DK" smtClean="0"/>
-              <a:t>Has </a:t>
-            </a:r>
-            <a:r>
-              <a:rPr lang="da-DK" smtClean="0"/>
-              <a:t>complete control of implementation</a:t>
+              <a:t>Has complete control of implementation</a:t>
             </a:r>
             <a:endParaRPr lang="da-DK"/>
           </a:p>
@@ -14766,12 +14900,6 @@
               </a:rPr>
               <a:t>    }</a:t>
             </a:r>
-            <a:endParaRPr lang="da-DK" b="1" smtClean="0">
-              <a:solidFill>
-                <a:srgbClr val="000000"/>
-              </a:solidFill>
-              <a:latin typeface="Consolas" panose="020B0609020204030204" pitchFamily="49" charset="0"/>
-            </a:endParaRPr>
           </a:p>
           <a:p>
             <a:r>
@@ -14783,12 +14911,6 @@
               </a:rPr>
               <a:t>}</a:t>
             </a:r>
-            <a:endParaRPr lang="da-DK" b="1" smtClean="0">
-              <a:solidFill>
-                <a:srgbClr val="000000"/>
-              </a:solidFill>
-              <a:latin typeface="Consolas" panose="020B0609020204030204" pitchFamily="49" charset="0"/>
-            </a:endParaRPr>
           </a:p>
           <a:p>
             <a:endParaRPr lang="da-DK" b="1" smtClean="0">
@@ -15059,16 +15181,7 @@
                 </a:solidFill>
                 <a:latin typeface="Consolas" panose="020B0609020204030204" pitchFamily="49" charset="0"/>
               </a:rPr>
-              <a:t>(</a:t>
-            </a:r>
-            <a:r>
-              <a:rPr lang="da-DK" sz="1600" b="1">
-                <a:solidFill>
-                  <a:srgbClr val="000000"/>
-                </a:solidFill>
-                <a:latin typeface="Consolas" panose="020B0609020204030204" pitchFamily="49" charset="0"/>
-              </a:rPr>
-              <a:t>FoodAround</a:t>
+              <a:t>(FoodAround</a:t>
             </a:r>
             <a:r>
               <a:rPr lang="da-DK" sz="1600" b="1" smtClean="0">
@@ -15503,11 +15616,7 @@
             <a:pPr lvl="1"/>
             <a:r>
               <a:rPr lang="da-DK" smtClean="0"/>
-              <a:t>Almost none</a:t>
-            </a:r>
-            <a:r>
-              <a:rPr lang="da-DK" smtClean="0"/>
-              <a:t>…</a:t>
+              <a:t>Almost none…</a:t>
             </a:r>
           </a:p>
           <a:p>
@@ -15726,11 +15835,7 @@
             <a:pPr lvl="1"/>
             <a:r>
               <a:rPr lang="da-DK" smtClean="0"/>
-              <a:t>Uses own methods for </a:t>
-            </a:r>
-            <a:r>
-              <a:rPr lang="da-DK" smtClean="0"/>
-              <a:t>implementation</a:t>
+              <a:t>Uses own methods for implementation</a:t>
             </a:r>
           </a:p>
           <a:p>
@@ -15739,7 +15844,6 @@
               <a:rPr lang="da-DK" smtClean="0"/>
               <a:t>May call library-like methods in base class</a:t>
             </a:r>
-            <a:endParaRPr lang="da-DK" smtClean="0"/>
           </a:p>
           <a:p>
             <a:pPr lvl="1"/>
@@ -16078,11 +16182,7 @@
           <a:p>
             <a:r>
               <a:rPr lang="da-DK" sz="3200" i="1" smtClean="0"/>
-              <a:t>The </a:t>
-            </a:r>
-            <a:r>
-              <a:rPr lang="da-DK" sz="3200" i="1" smtClean="0"/>
-              <a:t>behaviors of </a:t>
+              <a:t>The behaviors of </a:t>
             </a:r>
             <a:r>
               <a:rPr lang="da-DK" sz="3200" i="1" u="sng" smtClean="0"/>
@@ -16129,13 +16229,13 @@
   <p:clrMapOvr>
     <a:masterClrMapping/>
   </p:clrMapOvr>
-  <mc:AlternateContent xmlns:mc="http://schemas.openxmlformats.org/markup-compatibility/2006">
-    <mc:Choice xmlns:p14="http://schemas.microsoft.com/office/powerpoint/2010/main" Requires="p14">
+  <mc:AlternateContent xmlns:mc="http://schemas.openxmlformats.org/markup-compatibility/2006" xmlns:p14="http://schemas.microsoft.com/office/powerpoint/2010/main">
+    <mc:Choice Requires="p14">
       <p:transition spd="med" p14:dur="700">
         <p:fade/>
       </p:transition>
     </mc:Choice>
-    <mc:Fallback>
+    <mc:Fallback xmlns="">
       <p:transition spd="med">
         <p:fade/>
       </p:transition>
@@ -16213,11 +16313,7 @@
           <a:p>
             <a:r>
               <a:rPr lang="da-DK" sz="3200" i="1" smtClean="0"/>
-              <a:t>The </a:t>
-            </a:r>
-            <a:r>
-              <a:rPr lang="da-DK" sz="3200" i="1" smtClean="0"/>
-              <a:t>behaviors of </a:t>
+              <a:t>The behaviors of </a:t>
             </a:r>
             <a:r>
               <a:rPr lang="da-DK" sz="3200" i="1" u="sng" smtClean="0"/>
@@ -16249,11 +16345,7 @@
             </a:r>
             <a:r>
               <a:rPr lang="da-DK" sz="3200" i="1" smtClean="0"/>
-              <a:t> animal type</a:t>
-            </a:r>
-            <a:r>
-              <a:rPr lang="da-DK" sz="3200" i="1" smtClean="0"/>
-              <a:t>.</a:t>
+              <a:t> animal type.</a:t>
             </a:r>
           </a:p>
           <a:p>
@@ -16273,11 +16365,7 @@
             </a:r>
             <a:r>
               <a:rPr lang="da-DK" sz="3200"/>
-              <a:t> allow specific animal classes to implement behavior </a:t>
-            </a:r>
-            <a:r>
-              <a:rPr lang="da-DK" sz="3200"/>
-              <a:t>freely</a:t>
+              <a:t> allow specific animal classes to implement behavior freely</a:t>
             </a:r>
             <a:r>
               <a:rPr lang="da-DK" sz="3200" smtClean="0"/>
@@ -16297,13 +16385,13 @@
   <p:clrMapOvr>
     <a:masterClrMapping/>
   </p:clrMapOvr>
-  <mc:AlternateContent xmlns:mc="http://schemas.openxmlformats.org/markup-compatibility/2006">
-    <mc:Choice xmlns:p14="http://schemas.microsoft.com/office/powerpoint/2010/main" Requires="p14">
+  <mc:AlternateContent xmlns:mc="http://schemas.openxmlformats.org/markup-compatibility/2006" xmlns:p14="http://schemas.microsoft.com/office/powerpoint/2010/main">
+    <mc:Choice Requires="p14">
       <p:transition spd="med" p14:dur="700">
         <p:fade/>
       </p:transition>
     </mc:Choice>
-    <mc:Fallback>
+    <mc:Fallback xmlns="">
       <p:transition spd="med">
         <p:fade/>
       </p:transition>
@@ -18571,15 +18659,7 @@
             </a:r>
             <a:r>
               <a:rPr lang="da-DK" smtClean="0"/>
-              <a:t> </a:t>
-            </a:r>
-            <a:r>
-              <a:rPr lang="da-DK" smtClean="0"/>
-              <a:t>algorithm </a:t>
-            </a:r>
-            <a:r>
-              <a:rPr lang="da-DK" smtClean="0"/>
-              <a:t>for </a:t>
+              <a:t> algorithm for </a:t>
             </a:r>
             <a:r>
               <a:rPr lang="da-DK" b="1" smtClean="0"/>
@@ -18617,15 +18697,7 @@
             </a:r>
             <a:r>
               <a:rPr lang="da-DK" smtClean="0"/>
-              <a:t>; it </a:t>
-            </a:r>
-            <a:r>
-              <a:rPr lang="da-DK" smtClean="0"/>
-              <a:t>cannot </a:t>
-            </a:r>
-            <a:r>
-              <a:rPr lang="da-DK" smtClean="0"/>
-              <a:t>be changed by subclasses</a:t>
+              <a:t>; it cannot be changed by subclasses</a:t>
             </a:r>
             <a:endParaRPr lang="da-DK"/>
           </a:p>
@@ -19633,13 +19705,13 @@
   <p:clrMapOvr>
     <a:masterClrMapping/>
   </p:clrMapOvr>
-  <mc:AlternateContent xmlns:mc="http://schemas.openxmlformats.org/markup-compatibility/2006">
-    <mc:Choice xmlns:p14="http://schemas.microsoft.com/office/powerpoint/2010/main" Requires="p14">
+  <mc:AlternateContent xmlns:mc="http://schemas.openxmlformats.org/markup-compatibility/2006" xmlns:p14="http://schemas.microsoft.com/office/powerpoint/2010/main">
+    <mc:Choice Requires="p14">
       <p:transition spd="med" p14:dur="700">
         <p:fade/>
       </p:transition>
     </mc:Choice>
-    <mc:Fallback>
+    <mc:Fallback xmlns="">
       <p:transition spd="med">
         <p:fade/>
       </p:transition>
@@ -20731,13 +20803,13 @@
   <p:clrMapOvr>
     <a:masterClrMapping/>
   </p:clrMapOvr>
-  <mc:AlternateContent xmlns:mc="http://schemas.openxmlformats.org/markup-compatibility/2006">
-    <mc:Choice xmlns:p14="http://schemas.microsoft.com/office/powerpoint/2010/main" Requires="p14">
+  <mc:AlternateContent xmlns:mc="http://schemas.openxmlformats.org/markup-compatibility/2006" xmlns:p14="http://schemas.microsoft.com/office/powerpoint/2010/main">
+    <mc:Choice Requires="p14">
       <p:transition spd="med" p14:dur="700">
         <p:fade/>
       </p:transition>
     </mc:Choice>
-    <mc:Fallback>
+    <mc:Fallback xmlns="">
       <p:transition spd="med">
         <p:fade/>
       </p:transition>
@@ -20866,11 +20938,7 @@
             <a:pPr algn="ctr"/>
             <a:r>
               <a:rPr lang="da-DK" sz="6000" b="1" smtClean="0"/>
-              <a:t>Dependency </a:t>
-            </a:r>
-            <a:r>
-              <a:rPr lang="da-DK" sz="6000" b="1" smtClean="0"/>
-              <a:t>Injection</a:t>
+              <a:t>Dependency Injection</a:t>
             </a:r>
             <a:br>
               <a:rPr lang="da-DK" sz="6000" b="1" smtClean="0"/>
@@ -23967,18 +24035,7 @@
                 <a:ea typeface="Calibri" panose="020F0502020204030204" pitchFamily="34" charset="0"/>
                 <a:cs typeface="Consolas" panose="020B0609020204030204" pitchFamily="49" charset="0"/>
               </a:rPr>
-              <a:t> _</a:t>
-            </a:r>
-            <a:r>
-              <a:rPr lang="en-US" sz="1400" b="1">
-                <a:solidFill>
-                  <a:srgbClr val="000000"/>
-                </a:solidFill>
-                <a:latin typeface="Consolas" panose="020B0609020204030204" pitchFamily="49" charset="0"/>
-                <a:ea typeface="Calibri" panose="020F0502020204030204" pitchFamily="34" charset="0"/>
-                <a:cs typeface="Consolas" panose="020B0609020204030204" pitchFamily="49" charset="0"/>
-              </a:rPr>
-              <a:t>noOfSides</a:t>
+              <a:t> _noOfSides</a:t>
             </a:r>
             <a:r>
               <a:rPr lang="en-US" sz="1400" b="1" smtClean="0">
@@ -24309,29 +24366,7 @@
                 <a:ea typeface="Calibri" panose="020F0502020204030204" pitchFamily="34" charset="0"/>
                 <a:cs typeface="Consolas" panose="020B0609020204030204" pitchFamily="49" charset="0"/>
               </a:rPr>
-              <a:t>	</a:t>
-            </a:r>
-            <a:r>
-              <a:rPr lang="en-US" sz="1400" b="1">
-                <a:solidFill>
-                  <a:srgbClr val="000000"/>
-                </a:solidFill>
-                <a:latin typeface="Consolas" panose="020B0609020204030204" pitchFamily="49" charset="0"/>
-                <a:ea typeface="Calibri" panose="020F0502020204030204" pitchFamily="34" charset="0"/>
-                <a:cs typeface="Consolas" panose="020B0609020204030204" pitchFamily="49" charset="0"/>
-              </a:rPr>
-              <a:t>_noOfSides = noOfSides</a:t>
-            </a:r>
-            <a:r>
-              <a:rPr lang="en-US" sz="1400" b="1">
-                <a:solidFill>
-                  <a:srgbClr val="000000"/>
-                </a:solidFill>
-                <a:latin typeface="Consolas" panose="020B0609020204030204" pitchFamily="49" charset="0"/>
-                <a:ea typeface="Calibri" panose="020F0502020204030204" pitchFamily="34" charset="0"/>
-                <a:cs typeface="Consolas" panose="020B0609020204030204" pitchFamily="49" charset="0"/>
-              </a:rPr>
-              <a:t>; </a:t>
+              <a:t>	_noOfSides = noOfSides; </a:t>
             </a:r>
             <a:r>
               <a:rPr lang="en-US" sz="1400" b="1">
@@ -24932,11 +24967,7 @@
             <a:pPr algn="ctr"/>
             <a:r>
               <a:rPr lang="da-DK" sz="6000" b="1" smtClean="0"/>
-              <a:t>Dependency </a:t>
-            </a:r>
-            <a:r>
-              <a:rPr lang="da-DK" sz="6000" b="1" smtClean="0"/>
-              <a:t>Injection</a:t>
+              <a:t>Dependency Injection</a:t>
             </a:r>
             <a:br>
               <a:rPr lang="da-DK" sz="6000" b="1" smtClean="0"/>
@@ -38012,11 +38043,7 @@
             <a:pPr algn="ctr"/>
             <a:r>
               <a:rPr lang="da-DK" sz="6000" b="1" smtClean="0"/>
-              <a:t>Dependency </a:t>
-            </a:r>
-            <a:r>
-              <a:rPr lang="da-DK" sz="6000" b="1" smtClean="0"/>
-              <a:t>Injection</a:t>
+              <a:t>Dependency Injection</a:t>
             </a:r>
             <a:br>
               <a:rPr lang="da-DK" sz="6000" b="1" smtClean="0"/>
@@ -42353,6 +42380,78 @@
       </p:grpSpPr>
       <p:sp>
         <p:nvSpPr>
+          <p:cNvPr id="2" name="Titel 1"/>
+          <p:cNvSpPr>
+            <a:spLocks noGrp="1"/>
+          </p:cNvSpPr>
+          <p:nvPr>
+            <p:ph type="title"/>
+          </p:nvPr>
+        </p:nvSpPr>
+        <p:spPr>
+          <a:xfrm>
+            <a:off x="831427" y="2342938"/>
+            <a:ext cx="10515600" cy="1325563"/>
+          </a:xfrm>
+        </p:spPr>
+        <p:txBody>
+          <a:bodyPr>
+            <a:noAutofit/>
+          </a:bodyPr>
+          <a:lstStyle/>
+          <a:p>
+            <a:pPr algn="ctr"/>
+            <a:r>
+              <a:rPr lang="da-DK" sz="9600" b="1" smtClean="0"/>
+              <a:t>Object-level </a:t>
+            </a:r>
+            <a:r>
+              <a:rPr lang="da-DK" sz="9600" b="1" smtClean="0"/>
+              <a:t>IoC</a:t>
+            </a:r>
+            <a:endParaRPr lang="da-DK" sz="9600" b="1"/>
+          </a:p>
+        </p:txBody>
+      </p:sp>
+    </p:spTree>
+    <p:extLst>
+      <p:ext uri="{BB962C8B-B14F-4D97-AF65-F5344CB8AC3E}">
+        <p14:creationId xmlns:p14="http://schemas.microsoft.com/office/powerpoint/2010/main" val="2651182066"/>
+      </p:ext>
+    </p:extLst>
+  </p:cSld>
+  <p:clrMapOvr>
+    <a:masterClrMapping/>
+  </p:clrMapOvr>
+  <p:timing>
+    <p:tnLst>
+      <p:par>
+        <p:cTn id="1" dur="indefinite" restart="never" nodeType="tmRoot"/>
+      </p:par>
+    </p:tnLst>
+  </p:timing>
+</p:sld>
+</file>
+
+<file path=ppt/slides/slide93.xml><?xml version="1.0" encoding="utf-8"?>
+<p:sld xmlns:a="http://schemas.openxmlformats.org/drawingml/2006/main" xmlns:r="http://schemas.openxmlformats.org/officeDocument/2006/relationships" xmlns:p="http://schemas.openxmlformats.org/presentationml/2006/main">
+  <p:cSld>
+    <p:spTree>
+      <p:nvGrpSpPr>
+        <p:cNvPr id="1" name=""/>
+        <p:cNvGrpSpPr/>
+        <p:nvPr/>
+      </p:nvGrpSpPr>
+      <p:grpSpPr>
+        <a:xfrm>
+          <a:off x="0" y="0"/>
+          <a:ext cx="0" cy="0"/>
+          <a:chOff x="0" y="0"/>
+          <a:chExt cx="0" cy="0"/>
+        </a:xfrm>
+      </p:grpSpPr>
+      <p:sp>
+        <p:nvSpPr>
           <p:cNvPr id="3" name="Tekstfelt 2"/>
           <p:cNvSpPr txBox="1"/>
           <p:nvPr/>
@@ -42832,18 +42931,7 @@
                 <a:ea typeface="Calibri" panose="020F0502020204030204" pitchFamily="34" charset="0"/>
                 <a:cs typeface="Consolas" panose="020B0609020204030204" pitchFamily="49" charset="0"/>
               </a:rPr>
-              <a:t>// </a:t>
-            </a:r>
-            <a:r>
-              <a:rPr lang="en-US" sz="1600" b="1">
-                <a:solidFill>
-                  <a:srgbClr val="008000"/>
-                </a:solidFill>
-                <a:latin typeface="Consolas" panose="020B0609020204030204" pitchFamily="49" charset="0"/>
-                <a:ea typeface="Calibri" panose="020F0502020204030204" pitchFamily="34" charset="0"/>
-                <a:cs typeface="Consolas" panose="020B0609020204030204" pitchFamily="49" charset="0"/>
-              </a:rPr>
-              <a:t>Low </a:t>
+              <a:t>// Low </a:t>
             </a:r>
             <a:r>
               <a:rPr lang="en-US" sz="1600" b="1" smtClean="0">
@@ -43287,7 +43375,7 @@
 </p:sld>
 </file>
 
-<file path=ppt/slides/slide93.xml><?xml version="1.0" encoding="utf-8"?>
+<file path=ppt/slides/slide94.xml><?xml version="1.0" encoding="utf-8"?>
 <p:sld xmlns:a="http://schemas.openxmlformats.org/drawingml/2006/main" xmlns:r="http://schemas.openxmlformats.org/officeDocument/2006/relationships" xmlns:p="http://schemas.openxmlformats.org/presentationml/2006/main">
   <p:cSld>
     <p:spTree>
@@ -43928,18 +44016,7 @@
                 <a:ea typeface="Calibri" panose="020F0502020204030204" pitchFamily="34" charset="0"/>
                 <a:cs typeface="Consolas" panose="020B0609020204030204" pitchFamily="49" charset="0"/>
               </a:rPr>
-              <a:t> </a:t>
-            </a:r>
-            <a:r>
-              <a:rPr lang="en-US" sz="1600" b="1">
-                <a:solidFill>
-                  <a:srgbClr val="000000"/>
-                </a:solidFill>
-                <a:latin typeface="Consolas" panose="020B0609020204030204" pitchFamily="49" charset="0"/>
-                <a:ea typeface="Calibri" panose="020F0502020204030204" pitchFamily="34" charset="0"/>
-                <a:cs typeface="Consolas" panose="020B0609020204030204" pitchFamily="49" charset="0"/>
-              </a:rPr>
-              <a:t>	</a:t>
+              <a:t> 	</a:t>
             </a:r>
             <a:r>
               <a:rPr lang="en-US" sz="1600" b="1" smtClean="0">
@@ -44172,7 +44249,7 @@
 </p:sld>
 </file>
 
-<file path=ppt/slides/slide94.xml><?xml version="1.0" encoding="utf-8"?>
+<file path=ppt/slides/slide95.xml><?xml version="1.0" encoding="utf-8"?>
 <p:sld xmlns:a="http://schemas.openxmlformats.org/drawingml/2006/main" xmlns:r="http://schemas.openxmlformats.org/officeDocument/2006/relationships" xmlns:p="http://schemas.openxmlformats.org/presentationml/2006/main">
   <p:cSld>
     <p:spTree>
@@ -44901,7 +44978,7 @@
 </p:sld>
 </file>
 
-<file path=ppt/slides/slide95.xml><?xml version="1.0" encoding="utf-8"?>
+<file path=ppt/slides/slide96.xml><?xml version="1.0" encoding="utf-8"?>
 <p:sld xmlns:a="http://schemas.openxmlformats.org/drawingml/2006/main" xmlns:r="http://schemas.openxmlformats.org/officeDocument/2006/relationships" xmlns:p="http://schemas.openxmlformats.org/presentationml/2006/main">
   <p:cSld>
     <p:spTree>
@@ -44968,130 +45045,6 @@
     <p:extLst>
       <p:ext uri="{BB962C8B-B14F-4D97-AF65-F5344CB8AC3E}">
         <p14:creationId xmlns:p14="http://schemas.microsoft.com/office/powerpoint/2010/main" val="1687579555"/>
-      </p:ext>
-    </p:extLst>
-  </p:cSld>
-  <p:clrMapOvr>
-    <a:masterClrMapping/>
-  </p:clrMapOvr>
-  <p:timing>
-    <p:tnLst>
-      <p:par>
-        <p:cTn id="1" dur="indefinite" restart="never" nodeType="tmRoot"/>
-      </p:par>
-    </p:tnLst>
-  </p:timing>
-</p:sld>
-</file>
-
-<file path=ppt/slides/slide96.xml><?xml version="1.0" encoding="utf-8"?>
-<p:sld xmlns:a="http://schemas.openxmlformats.org/drawingml/2006/main" xmlns:r="http://schemas.openxmlformats.org/officeDocument/2006/relationships" xmlns:p="http://schemas.openxmlformats.org/presentationml/2006/main">
-  <p:cSld>
-    <p:spTree>
-      <p:nvGrpSpPr>
-        <p:cNvPr id="1" name=""/>
-        <p:cNvGrpSpPr/>
-        <p:nvPr/>
-      </p:nvGrpSpPr>
-      <p:grpSpPr>
-        <a:xfrm>
-          <a:off x="0" y="0"/>
-          <a:ext cx="0" cy="0"/>
-          <a:chOff x="0" y="0"/>
-          <a:chExt cx="0" cy="0"/>
-        </a:xfrm>
-      </p:grpSpPr>
-      <p:sp>
-        <p:nvSpPr>
-          <p:cNvPr id="2" name="Titel 1"/>
-          <p:cNvSpPr>
-            <a:spLocks noGrp="1"/>
-          </p:cNvSpPr>
-          <p:nvPr>
-            <p:ph type="title"/>
-          </p:nvPr>
-        </p:nvSpPr>
-        <p:spPr/>
-        <p:txBody>
-          <a:bodyPr/>
-          <a:lstStyle/>
-          <a:p>
-            <a:r>
-              <a:rPr lang="da-DK" b="1" smtClean="0">
-                <a:solidFill>
-                  <a:srgbClr val="FF0000"/>
-                </a:solidFill>
-              </a:rPr>
-              <a:t>S</a:t>
-            </a:r>
-            <a:r>
-              <a:rPr lang="da-DK" b="1" smtClean="0"/>
-              <a:t>ingle Responsibility</a:t>
-            </a:r>
-            <a:endParaRPr lang="da-DK" b="1"/>
-          </a:p>
-        </p:txBody>
-      </p:sp>
-      <p:sp>
-        <p:nvSpPr>
-          <p:cNvPr id="3" name="Pladsholder til indhold 2"/>
-          <p:cNvSpPr>
-            <a:spLocks noGrp="1"/>
-          </p:cNvSpPr>
-          <p:nvPr>
-            <p:ph idx="1"/>
-          </p:nvPr>
-        </p:nvSpPr>
-        <p:spPr>
-          <a:xfrm>
-            <a:off x="838200" y="1825625"/>
-            <a:ext cx="6344653" cy="4351338"/>
-          </a:xfrm>
-        </p:spPr>
-        <p:txBody>
-          <a:bodyPr/>
-          <a:lstStyle/>
-          <a:p>
-            <a:r>
-              <a:rPr lang="da-DK" sz="3200" smtClean="0"/>
-              <a:t>Classes should only have </a:t>
-            </a:r>
-            <a:r>
-              <a:rPr lang="da-DK" sz="3200" b="1" smtClean="0"/>
-              <a:t>one</a:t>
-            </a:r>
-            <a:r>
-              <a:rPr lang="da-DK" sz="3200" smtClean="0"/>
-              <a:t> main responsibility</a:t>
-            </a:r>
-          </a:p>
-          <a:p>
-            <a:r>
-              <a:rPr lang="da-DK" sz="3200" smtClean="0"/>
-              <a:t>=&gt; classes should only have </a:t>
-            </a:r>
-            <a:r>
-              <a:rPr lang="da-DK" sz="3200" b="1" smtClean="0"/>
-              <a:t>one</a:t>
-            </a:r>
-            <a:r>
-              <a:rPr lang="da-DK" sz="3200" smtClean="0"/>
-              <a:t> reason to change</a:t>
-            </a:r>
-          </a:p>
-          <a:p>
-            <a:r>
-              <a:rPr lang="da-DK" sz="3200" smtClean="0"/>
-              <a:t>Keep classes small, focused and abstract</a:t>
-            </a:r>
-            <a:endParaRPr lang="da-DK" sz="3200"/>
-          </a:p>
-        </p:txBody>
-      </p:sp>
-    </p:spTree>
-    <p:extLst>
-      <p:ext uri="{BB962C8B-B14F-4D97-AF65-F5344CB8AC3E}">
-        <p14:creationId xmlns:p14="http://schemas.microsoft.com/office/powerpoint/2010/main" val="3109857517"/>
       </p:ext>
     </p:extLst>
   </p:cSld>
@@ -45178,7 +45131,35 @@
           <a:p>
             <a:r>
               <a:rPr lang="da-DK" sz="3200" smtClean="0"/>
-              <a:t>More to follow…</a:t>
+              <a:t>Classes should only have </a:t>
+            </a:r>
+            <a:r>
+              <a:rPr lang="da-DK" sz="3200" b="1" smtClean="0"/>
+              <a:t>one</a:t>
+            </a:r>
+            <a:r>
+              <a:rPr lang="da-DK" sz="3200" smtClean="0"/>
+              <a:t> main responsibility</a:t>
+            </a:r>
+          </a:p>
+          <a:p>
+            <a:r>
+              <a:rPr lang="da-DK" sz="3200" smtClean="0"/>
+              <a:t>=&gt; classes should only have </a:t>
+            </a:r>
+            <a:r>
+              <a:rPr lang="da-DK" sz="3200" b="1" smtClean="0"/>
+              <a:t>one</a:t>
+            </a:r>
+            <a:r>
+              <a:rPr lang="da-DK" sz="3200" smtClean="0"/>
+              <a:t> reason to change</a:t>
+            </a:r>
+          </a:p>
+          <a:p>
+            <a:r>
+              <a:rPr lang="da-DK" sz="3200" smtClean="0"/>
+              <a:t>Keep classes small, focused and abstract</a:t>
             </a:r>
             <a:endParaRPr lang="da-DK" sz="3200"/>
           </a:p>
@@ -45187,7 +45168,7 @@
     </p:spTree>
     <p:extLst>
       <p:ext uri="{BB962C8B-B14F-4D97-AF65-F5344CB8AC3E}">
-        <p14:creationId xmlns:p14="http://schemas.microsoft.com/office/powerpoint/2010/main" val="1470500991"/>
+        <p14:creationId xmlns:p14="http://schemas.microsoft.com/office/powerpoint/2010/main" val="3109857517"/>
       </p:ext>
     </p:extLst>
   </p:cSld>
@@ -45231,46 +45212,59 @@
             <p:ph type="title"/>
           </p:nvPr>
         </p:nvSpPr>
+        <p:spPr/>
+        <p:txBody>
+          <a:bodyPr/>
+          <a:lstStyle/>
+          <a:p>
+            <a:r>
+              <a:rPr lang="da-DK" b="1" smtClean="0">
+                <a:solidFill>
+                  <a:srgbClr val="FF0000"/>
+                </a:solidFill>
+              </a:rPr>
+              <a:t>S</a:t>
+            </a:r>
+            <a:r>
+              <a:rPr lang="da-DK" b="1" smtClean="0"/>
+              <a:t>ingle Responsibility</a:t>
+            </a:r>
+            <a:endParaRPr lang="da-DK" b="1"/>
+          </a:p>
+        </p:txBody>
+      </p:sp>
+      <p:sp>
+        <p:nvSpPr>
+          <p:cNvPr id="3" name="Pladsholder til indhold 2"/>
+          <p:cNvSpPr>
+            <a:spLocks noGrp="1"/>
+          </p:cNvSpPr>
+          <p:nvPr>
+            <p:ph idx="1"/>
+          </p:nvPr>
+        </p:nvSpPr>
         <p:spPr>
           <a:xfrm>
-            <a:off x="831427" y="800100"/>
-            <a:ext cx="10515600" cy="4938963"/>
+            <a:off x="838200" y="1825625"/>
+            <a:ext cx="6344653" cy="4351338"/>
           </a:xfrm>
         </p:spPr>
         <p:txBody>
-          <a:bodyPr>
-            <a:noAutofit/>
-          </a:bodyPr>
+          <a:bodyPr/>
           <a:lstStyle/>
           <a:p>
-            <a:pPr algn="ctr"/>
-            <a:r>
-              <a:rPr lang="da-DK" sz="9600" b="1" smtClean="0">
-                <a:solidFill>
-                  <a:srgbClr val="FF0000"/>
-                </a:solidFill>
-              </a:rPr>
-              <a:t>O</a:t>
-            </a:r>
-            <a:r>
-              <a:rPr lang="da-DK" sz="9600" b="1" smtClean="0"/>
-              <a:t>pen/Close</a:t>
-            </a:r>
-            <a:br>
-              <a:rPr lang="da-DK" sz="9600" b="1" smtClean="0"/>
-            </a:br>
-            <a:r>
-              <a:rPr lang="da-DK" sz="9600" b="1" smtClean="0"/>
-              <a:t> Resposibility</a:t>
-            </a:r>
-            <a:endParaRPr lang="da-DK" sz="9600" b="1"/>
+            <a:r>
+              <a:rPr lang="da-DK" sz="3200" smtClean="0"/>
+              <a:t>More to follow…</a:t>
+            </a:r>
+            <a:endParaRPr lang="da-DK" sz="3200"/>
           </a:p>
         </p:txBody>
       </p:sp>
     </p:spTree>
     <p:extLst>
       <p:ext uri="{BB962C8B-B14F-4D97-AF65-F5344CB8AC3E}">
-        <p14:creationId xmlns:p14="http://schemas.microsoft.com/office/powerpoint/2010/main" val="1334827766"/>
+        <p14:creationId xmlns:p14="http://schemas.microsoft.com/office/powerpoint/2010/main" val="1470500991"/>
       </p:ext>
     </p:extLst>
   </p:cSld>
@@ -45314,119 +45308,46 @@
             <p:ph type="title"/>
           </p:nvPr>
         </p:nvSpPr>
-        <p:spPr/>
-        <p:txBody>
-          <a:bodyPr/>
-          <a:lstStyle/>
-          <a:p>
-            <a:r>
-              <a:rPr lang="da-DK" b="1" smtClean="0">
-                <a:solidFill>
-                  <a:srgbClr val="FF0000"/>
-                </a:solidFill>
-              </a:rPr>
-              <a:t>O</a:t>
-            </a:r>
-            <a:r>
-              <a:rPr lang="da-DK" b="1" smtClean="0"/>
-              <a:t>pen/Closed</a:t>
-            </a:r>
-            <a:endParaRPr lang="da-DK" b="1"/>
-          </a:p>
-        </p:txBody>
-      </p:sp>
-      <p:sp>
-        <p:nvSpPr>
-          <p:cNvPr id="3" name="Pladsholder til indhold 2"/>
-          <p:cNvSpPr>
-            <a:spLocks noGrp="1"/>
-          </p:cNvSpPr>
-          <p:nvPr>
-            <p:ph idx="1"/>
-          </p:nvPr>
-        </p:nvSpPr>
         <p:spPr>
           <a:xfrm>
-            <a:off x="838199" y="1825625"/>
-            <a:ext cx="8456195" cy="4351338"/>
+            <a:off x="831427" y="800100"/>
+            <a:ext cx="10515600" cy="4938963"/>
           </a:xfrm>
         </p:spPr>
         <p:txBody>
-          <a:bodyPr/>
+          <a:bodyPr>
+            <a:noAutofit/>
+          </a:bodyPr>
           <a:lstStyle/>
           <a:p>
-            <a:r>
-              <a:rPr lang="da-DK" sz="3200" smtClean="0"/>
-              <a:t>Software entities should be </a:t>
-            </a:r>
-            <a:r>
-              <a:rPr lang="da-DK" sz="3200" b="1" smtClean="0"/>
-              <a:t>open</a:t>
-            </a:r>
-            <a:r>
-              <a:rPr lang="da-DK" sz="3200" smtClean="0"/>
-              <a:t> for </a:t>
-            </a:r>
-            <a:r>
-              <a:rPr lang="da-DK" sz="3200" b="1" smtClean="0"/>
-              <a:t>extension</a:t>
-            </a:r>
-            <a:r>
-              <a:rPr lang="da-DK" sz="3200" smtClean="0"/>
-              <a:t>, but </a:t>
-            </a:r>
-            <a:r>
-              <a:rPr lang="da-DK" sz="3200" b="1" smtClean="0"/>
-              <a:t>closed</a:t>
-            </a:r>
-            <a:r>
-              <a:rPr lang="da-DK" sz="3200" smtClean="0"/>
-              <a:t> for </a:t>
-            </a:r>
-            <a:r>
-              <a:rPr lang="da-DK" sz="3200" b="1" smtClean="0"/>
-              <a:t>modification</a:t>
-            </a:r>
-            <a:r>
-              <a:rPr lang="da-DK" sz="3200" smtClean="0"/>
-              <a:t>.</a:t>
-            </a:r>
-          </a:p>
-          <a:p>
-            <a:r>
-              <a:rPr lang="da-DK" sz="3200" b="1" smtClean="0"/>
-              <a:t>Open for extension</a:t>
-            </a:r>
-            <a:r>
-              <a:rPr lang="da-DK" sz="3200" smtClean="0"/>
-              <a:t>: behavior can be extended with new behaviors</a:t>
-            </a:r>
-          </a:p>
-          <a:p>
-            <a:r>
-              <a:rPr lang="da-DK" sz="3200" b="1" smtClean="0"/>
-              <a:t>Closed for modification</a:t>
-            </a:r>
-            <a:r>
-              <a:rPr lang="da-DK" sz="3200" smtClean="0"/>
-              <a:t>: Extension does </a:t>
-            </a:r>
-            <a:r>
-              <a:rPr lang="da-DK" sz="3200" u="sng" smtClean="0"/>
-              <a:t>not</a:t>
-            </a:r>
-            <a:r>
-              <a:rPr lang="da-DK" sz="3200" smtClean="0"/>
-              <a:t> require change in the source code for the entity</a:t>
-            </a:r>
-            <a:endParaRPr lang="da-DK" sz="3200"/>
+            <a:pPr algn="ctr"/>
+            <a:r>
+              <a:rPr lang="da-DK" sz="9600" b="1" smtClean="0">
+                <a:solidFill>
+                  <a:srgbClr val="FF0000"/>
+                </a:solidFill>
+              </a:rPr>
+              <a:t>O</a:t>
+            </a:r>
+            <a:r>
+              <a:rPr lang="da-DK" sz="9600" b="1" smtClean="0"/>
+              <a:t>pen/Close</a:t>
+            </a:r>
+            <a:br>
+              <a:rPr lang="da-DK" sz="9600" b="1" smtClean="0"/>
+            </a:br>
+            <a:r>
+              <a:rPr lang="da-DK" sz="9600" b="1" smtClean="0"/>
+              <a:t> Resposibility</a:t>
+            </a:r>
+            <a:endParaRPr lang="da-DK" sz="9600" b="1"/>
           </a:p>
         </p:txBody>
       </p:sp>
     </p:spTree>
     <p:extLst>
       <p:ext uri="{BB962C8B-B14F-4D97-AF65-F5344CB8AC3E}">
-        <p14:creationId xmlns:p14="http://schemas.microsoft.com/office/powerpoint/2010/main" val="72600078"/>
+        <p14:creationId xmlns:p14="http://schemas.microsoft.com/office/powerpoint/2010/main" val="1334827766"/>
       </p:ext>
     </p:extLst>
   </p:cSld>

</xml_diff>